<commit_message>
chapter 3 updates to templates
</commit_message>
<xml_diff>
--- a/icons.pptx
+++ b/icons.pptx
@@ -117,318 +117,8 @@
 </p:presentation>
 </file>
 
-<file path=ppt/changesInfos/changesInfo1.xml><?xml version="1.0" encoding="utf-8"?>
-<pc:chgInfo xmlns:a="http://schemas.openxmlformats.org/drawingml/2006/main" xmlns:r="http://schemas.openxmlformats.org/officeDocument/2006/relationships" xmlns:ac="http://schemas.microsoft.com/office/drawing/2013/main/command" xmlns:pc="http://schemas.microsoft.com/office/powerpoint/2013/main/command">
-  <pc:docChgLst>
-    <pc:chgData name="Isaac Valdez" userId="13e1ca45-44f1-4a8d-b954-611b20158646" providerId="ADAL" clId="{8F213521-C329-4D6F-8F55-1296599CF7D9}"/>
-    <pc:docChg chg="custSel addSld modSld">
-      <pc:chgData name="Isaac Valdez" userId="13e1ca45-44f1-4a8d-b954-611b20158646" providerId="ADAL" clId="{8F213521-C329-4D6F-8F55-1296599CF7D9}" dt="2017-09-21T13:55:23.554" v="197"/>
-      <pc:docMkLst>
-        <pc:docMk/>
-      </pc:docMkLst>
-      <pc:sldChg chg="addSp delSp modSp add">
-        <pc:chgData name="Isaac Valdez" userId="13e1ca45-44f1-4a8d-b954-611b20158646" providerId="ADAL" clId="{8F213521-C329-4D6F-8F55-1296599CF7D9}" dt="2017-09-19T13:47:25.900" v="42" actId="1076"/>
-        <pc:sldMkLst>
-          <pc:docMk/>
-          <pc:sldMk cId="31380459" sldId="258"/>
-        </pc:sldMkLst>
-        <pc:spChg chg="add mod">
-          <ac:chgData name="Isaac Valdez" userId="13e1ca45-44f1-4a8d-b954-611b20158646" providerId="ADAL" clId="{8F213521-C329-4D6F-8F55-1296599CF7D9}" dt="2017-09-19T13:47:17.962" v="38" actId="2085"/>
-          <ac:spMkLst>
-            <pc:docMk/>
-            <pc:sldMk cId="31380459" sldId="258"/>
-            <ac:spMk id="2" creationId="{24F64642-F443-4DF4-9EB0-92A8ED345A8F}"/>
-          </ac:spMkLst>
-        </pc:spChg>
-        <pc:spChg chg="add del">
-          <ac:chgData name="Isaac Valdez" userId="13e1ca45-44f1-4a8d-b954-611b20158646" providerId="ADAL" clId="{8F213521-C329-4D6F-8F55-1296599CF7D9}" dt="2017-09-19T13:47:24.384" v="40" actId="1076"/>
-          <ac:spMkLst>
-            <pc:docMk/>
-            <pc:sldMk cId="31380459" sldId="258"/>
-            <ac:spMk id="3" creationId="{C5E66179-BEF3-4756-86E5-D04213C55DB6}"/>
-          </ac:spMkLst>
-        </pc:spChg>
-        <pc:picChg chg="add mod">
-          <ac:chgData name="Isaac Valdez" userId="13e1ca45-44f1-4a8d-b954-611b20158646" providerId="ADAL" clId="{8F213521-C329-4D6F-8F55-1296599CF7D9}" dt="2017-09-19T13:47:25.900" v="42" actId="1076"/>
-          <ac:picMkLst>
-            <pc:docMk/>
-            <pc:sldMk cId="31380459" sldId="258"/>
-            <ac:picMk id="4" creationId="{E76A1A43-7E4C-42E1-96C4-99A14C417E38}"/>
-          </ac:picMkLst>
-        </pc:picChg>
-      </pc:sldChg>
-      <pc:sldChg chg="addSp delSp modSp add">
-        <pc:chgData name="Isaac Valdez" userId="13e1ca45-44f1-4a8d-b954-611b20158646" providerId="ADAL" clId="{8F213521-C329-4D6F-8F55-1296599CF7D9}" dt="2017-09-19T14:16:35.907" v="74" actId="1076"/>
-        <pc:sldMkLst>
-          <pc:docMk/>
-          <pc:sldMk cId="2565339153" sldId="259"/>
-        </pc:sldMkLst>
-        <pc:spChg chg="add mod">
-          <ac:chgData name="Isaac Valdez" userId="13e1ca45-44f1-4a8d-b954-611b20158646" providerId="ADAL" clId="{8F213521-C329-4D6F-8F55-1296599CF7D9}" dt="2017-09-19T14:15:50.797" v="59" actId="2085"/>
-          <ac:spMkLst>
-            <pc:docMk/>
-            <pc:sldMk cId="2565339153" sldId="259"/>
-            <ac:spMk id="2" creationId="{3924AF56-469D-4254-A0A1-E453592C244E}"/>
-          </ac:spMkLst>
-        </pc:spChg>
-        <pc:spChg chg="add mod">
-          <ac:chgData name="Isaac Valdez" userId="13e1ca45-44f1-4a8d-b954-611b20158646" providerId="ADAL" clId="{8F213521-C329-4D6F-8F55-1296599CF7D9}" dt="2017-09-19T14:15:47.269" v="58" actId="1076"/>
-          <ac:spMkLst>
-            <pc:docMk/>
-            <pc:sldMk cId="2565339153" sldId="259"/>
-            <ac:spMk id="3" creationId="{C3A60458-DD1A-424B-98DB-0B4D217DD8DA}"/>
-          </ac:spMkLst>
-        </pc:spChg>
-        <pc:spChg chg="add mod">
-          <ac:chgData name="Isaac Valdez" userId="13e1ca45-44f1-4a8d-b954-611b20158646" providerId="ADAL" clId="{8F213521-C329-4D6F-8F55-1296599CF7D9}" dt="2017-09-19T14:15:47.269" v="58" actId="1076"/>
-          <ac:spMkLst>
-            <pc:docMk/>
-            <pc:sldMk cId="2565339153" sldId="259"/>
-            <ac:spMk id="4" creationId="{0F7B2149-D0C5-4F18-9B46-F80C4BA49618}"/>
-          </ac:spMkLst>
-        </pc:spChg>
-        <pc:spChg chg="add mod">
-          <ac:chgData name="Isaac Valdez" userId="13e1ca45-44f1-4a8d-b954-611b20158646" providerId="ADAL" clId="{8F213521-C329-4D6F-8F55-1296599CF7D9}" dt="2017-09-19T14:15:47.269" v="58" actId="1076"/>
-          <ac:spMkLst>
-            <pc:docMk/>
-            <pc:sldMk cId="2565339153" sldId="259"/>
-            <ac:spMk id="5" creationId="{45811FDA-AA74-48F3-98B8-8B48E8FE4CD5}"/>
-          </ac:spMkLst>
-        </pc:spChg>
-        <pc:spChg chg="add del mod">
-          <ac:chgData name="Isaac Valdez" userId="13e1ca45-44f1-4a8d-b954-611b20158646" providerId="ADAL" clId="{8F213521-C329-4D6F-8F55-1296599CF7D9}" dt="2017-09-19T14:16:12.491" v="63" actId="478"/>
-          <ac:spMkLst>
-            <pc:docMk/>
-            <pc:sldMk cId="2565339153" sldId="259"/>
-            <ac:spMk id="6" creationId="{2348C144-BFC0-406F-A92F-4FC96813E442}"/>
-          </ac:spMkLst>
-        </pc:spChg>
-        <pc:spChg chg="add mod">
-          <ac:chgData name="Isaac Valdez" userId="13e1ca45-44f1-4a8d-b954-611b20158646" providerId="ADAL" clId="{8F213521-C329-4D6F-8F55-1296599CF7D9}" dt="2017-09-19T14:16:29.116" v="70" actId="1076"/>
-          <ac:spMkLst>
-            <pc:docMk/>
-            <pc:sldMk cId="2565339153" sldId="259"/>
-            <ac:spMk id="7" creationId="{50E4B0C5-0417-4E57-98B8-52D0B2DECA1D}"/>
-          </ac:spMkLst>
-        </pc:spChg>
-        <pc:spChg chg="add del">
-          <ac:chgData name="Isaac Valdez" userId="13e1ca45-44f1-4a8d-b954-611b20158646" providerId="ADAL" clId="{8F213521-C329-4D6F-8F55-1296599CF7D9}" dt="2017-09-19T14:16:34.461" v="72" actId="1076"/>
-          <ac:spMkLst>
-            <pc:docMk/>
-            <pc:sldMk cId="2565339153" sldId="259"/>
-            <ac:spMk id="8" creationId="{55E1AD91-CAA4-4B2F-958F-7EAEEB4BC0C8}"/>
-          </ac:spMkLst>
-        </pc:spChg>
-        <pc:spChg chg="add del">
-          <ac:chgData name="Isaac Valdez" userId="13e1ca45-44f1-4a8d-b954-611b20158646" providerId="ADAL" clId="{8F213521-C329-4D6F-8F55-1296599CF7D9}" dt="2017-09-19T14:16:34.461" v="72" actId="1076"/>
-          <ac:spMkLst>
-            <pc:docMk/>
-            <pc:sldMk cId="2565339153" sldId="259"/>
-            <ac:spMk id="9" creationId="{50C4EEC6-A838-470E-973B-225EF7EEB0D4}"/>
-          </ac:spMkLst>
-        </pc:spChg>
-        <pc:spChg chg="add del">
-          <ac:chgData name="Isaac Valdez" userId="13e1ca45-44f1-4a8d-b954-611b20158646" providerId="ADAL" clId="{8F213521-C329-4D6F-8F55-1296599CF7D9}" dt="2017-09-19T14:16:34.461" v="72" actId="1076"/>
-          <ac:spMkLst>
-            <pc:docMk/>
-            <pc:sldMk cId="2565339153" sldId="259"/>
-            <ac:spMk id="10" creationId="{A507FC4A-DB99-4A60-8C7E-51A85D63B218}"/>
-          </ac:spMkLst>
-        </pc:spChg>
-        <pc:spChg chg="add del">
-          <ac:chgData name="Isaac Valdez" userId="13e1ca45-44f1-4a8d-b954-611b20158646" providerId="ADAL" clId="{8F213521-C329-4D6F-8F55-1296599CF7D9}" dt="2017-09-19T14:16:34.461" v="72" actId="1076"/>
-          <ac:spMkLst>
-            <pc:docMk/>
-            <pc:sldMk cId="2565339153" sldId="259"/>
-            <ac:spMk id="11" creationId="{8EA441D6-9493-44B5-AECE-5E4A74826C5E}"/>
-          </ac:spMkLst>
-        </pc:spChg>
-        <pc:spChg chg="add del">
-          <ac:chgData name="Isaac Valdez" userId="13e1ca45-44f1-4a8d-b954-611b20158646" providerId="ADAL" clId="{8F213521-C329-4D6F-8F55-1296599CF7D9}" dt="2017-09-19T14:16:34.461" v="72" actId="1076"/>
-          <ac:spMkLst>
-            <pc:docMk/>
-            <pc:sldMk cId="2565339153" sldId="259"/>
-            <ac:spMk id="12" creationId="{572A9D39-D1E6-41F9-AF3B-EB2844336531}"/>
-          </ac:spMkLst>
-        </pc:spChg>
-        <pc:picChg chg="add mod">
-          <ac:chgData name="Isaac Valdez" userId="13e1ca45-44f1-4a8d-b954-611b20158646" providerId="ADAL" clId="{8F213521-C329-4D6F-8F55-1296599CF7D9}" dt="2017-09-19T14:16:35.907" v="74" actId="1076"/>
-          <ac:picMkLst>
-            <pc:docMk/>
-            <pc:sldMk cId="2565339153" sldId="259"/>
-            <ac:picMk id="13" creationId="{0BE16900-9C11-4837-9F5A-8A04029A0207}"/>
-          </ac:picMkLst>
-        </pc:picChg>
-      </pc:sldChg>
-      <pc:sldChg chg="addSp delSp modSp add">
-        <pc:chgData name="Isaac Valdez" userId="13e1ca45-44f1-4a8d-b954-611b20158646" providerId="ADAL" clId="{8F213521-C329-4D6F-8F55-1296599CF7D9}" dt="2017-09-21T13:26:07.200" v="133" actId="1076"/>
-        <pc:sldMkLst>
-          <pc:docMk/>
-          <pc:sldMk cId="2230733315" sldId="260"/>
-        </pc:sldMkLst>
-        <pc:spChg chg="add del mod">
-          <ac:chgData name="Isaac Valdez" userId="13e1ca45-44f1-4a8d-b954-611b20158646" providerId="ADAL" clId="{8F213521-C329-4D6F-8F55-1296599CF7D9}" dt="2017-09-21T13:24:52.558" v="114"/>
-          <ac:spMkLst>
-            <pc:docMk/>
-            <pc:sldMk cId="2230733315" sldId="260"/>
-            <ac:spMk id="2" creationId="{3A237E70-323B-494C-8AB2-513D7F24B865}"/>
-          </ac:spMkLst>
-        </pc:spChg>
-        <pc:spChg chg="add del mod">
-          <ac:chgData name="Isaac Valdez" userId="13e1ca45-44f1-4a8d-b954-611b20158646" providerId="ADAL" clId="{8F213521-C329-4D6F-8F55-1296599CF7D9}" dt="2017-09-21T13:22:52.345" v="80" actId="478"/>
-          <ac:spMkLst>
-            <pc:docMk/>
-            <pc:sldMk cId="2230733315" sldId="260"/>
-            <ac:spMk id="3" creationId="{087FF508-580A-4F10-8463-87BFBEB5D30F}"/>
-          </ac:spMkLst>
-        </pc:spChg>
-        <pc:spChg chg="add del mod">
-          <ac:chgData name="Isaac Valdez" userId="13e1ca45-44f1-4a8d-b954-611b20158646" providerId="ADAL" clId="{8F213521-C329-4D6F-8F55-1296599CF7D9}" dt="2017-09-21T13:24:52.558" v="114"/>
-          <ac:spMkLst>
-            <pc:docMk/>
-            <pc:sldMk cId="2230733315" sldId="260"/>
-            <ac:spMk id="4" creationId="{B6D35235-67E9-4350-9A18-41C47D8614EC}"/>
-          </ac:spMkLst>
-        </pc:spChg>
-        <pc:spChg chg="add del mod">
-          <ac:chgData name="Isaac Valdez" userId="13e1ca45-44f1-4a8d-b954-611b20158646" providerId="ADAL" clId="{8F213521-C329-4D6F-8F55-1296599CF7D9}" dt="2017-09-21T13:24:52.558" v="114"/>
-          <ac:spMkLst>
-            <pc:docMk/>
-            <pc:sldMk cId="2230733315" sldId="260"/>
-            <ac:spMk id="5" creationId="{53B91528-99FC-463F-B151-CA634A1EB2D0}"/>
-          </ac:spMkLst>
-        </pc:spChg>
-        <pc:spChg chg="add del mod">
-          <ac:chgData name="Isaac Valdez" userId="13e1ca45-44f1-4a8d-b954-611b20158646" providerId="ADAL" clId="{8F213521-C329-4D6F-8F55-1296599CF7D9}" dt="2017-09-21T13:25:14.319" v="119"/>
-          <ac:spMkLst>
-            <pc:docMk/>
-            <pc:sldMk cId="2230733315" sldId="260"/>
-            <ac:spMk id="6" creationId="{BAC6821A-EB83-4C7A-B413-4DBDF6A24C3F}"/>
-          </ac:spMkLst>
-        </pc:spChg>
-        <pc:spChg chg="add del mod">
-          <ac:chgData name="Isaac Valdez" userId="13e1ca45-44f1-4a8d-b954-611b20158646" providerId="ADAL" clId="{8F213521-C329-4D6F-8F55-1296599CF7D9}" dt="2017-09-21T13:25:14.319" v="119"/>
-          <ac:spMkLst>
-            <pc:docMk/>
-            <pc:sldMk cId="2230733315" sldId="260"/>
-            <ac:spMk id="7" creationId="{089D488E-C378-4BFF-8A8E-8AF0A6CB73B2}"/>
-          </ac:spMkLst>
-        </pc:spChg>
-        <pc:spChg chg="mod">
-          <ac:chgData name="Isaac Valdez" userId="13e1ca45-44f1-4a8d-b954-611b20158646" providerId="ADAL" clId="{8F213521-C329-4D6F-8F55-1296599CF7D9}" dt="2017-09-21T13:25:08.616" v="117"/>
-          <ac:spMkLst>
-            <pc:docMk/>
-            <pc:sldMk cId="2230733315" sldId="260"/>
-            <ac:spMk id="8" creationId="{FA1CD71A-8507-4606-99C0-A2056AAF616E}"/>
-          </ac:spMkLst>
-        </pc:spChg>
-        <pc:spChg chg="mod">
-          <ac:chgData name="Isaac Valdez" userId="13e1ca45-44f1-4a8d-b954-611b20158646" providerId="ADAL" clId="{8F213521-C329-4D6F-8F55-1296599CF7D9}" dt="2017-09-21T13:26:02.093" v="129" actId="688"/>
-          <ac:spMkLst>
-            <pc:docMk/>
-            <pc:sldMk cId="2230733315" sldId="260"/>
-            <ac:spMk id="9" creationId="{BE022264-1190-4D90-8547-1A6D9794E2A5}"/>
-          </ac:spMkLst>
-        </pc:spChg>
-        <pc:spChg chg="add del">
-          <ac:chgData name="Isaac Valdez" userId="13e1ca45-44f1-4a8d-b954-611b20158646" providerId="ADAL" clId="{8F213521-C329-4D6F-8F55-1296599CF7D9}" dt="2017-09-21T13:25:36.222" v="125"/>
-          <ac:spMkLst>
-            <pc:docMk/>
-            <pc:sldMk cId="2230733315" sldId="260"/>
-            <ac:spMk id="10" creationId="{6F9916C3-963F-4EF1-9BD2-E56824AC08F8}"/>
-          </ac:spMkLst>
-        </pc:spChg>
-        <pc:spChg chg="add del">
-          <ac:chgData name="Isaac Valdez" userId="13e1ca45-44f1-4a8d-b954-611b20158646" providerId="ADAL" clId="{8F213521-C329-4D6F-8F55-1296599CF7D9}" dt="2017-09-21T13:26:05.950" v="131"/>
-          <ac:spMkLst>
-            <pc:docMk/>
-            <pc:sldMk cId="2230733315" sldId="260"/>
-            <ac:spMk id="12" creationId="{4072763D-4505-4CF7-A623-533BCA2566A7}"/>
-          </ac:spMkLst>
-        </pc:spChg>
-        <pc:picChg chg="add del mod">
-          <ac:chgData name="Isaac Valdez" userId="13e1ca45-44f1-4a8d-b954-611b20158646" providerId="ADAL" clId="{8F213521-C329-4D6F-8F55-1296599CF7D9}" dt="2017-09-21T13:25:59.074" v="128" actId="478"/>
-          <ac:picMkLst>
-            <pc:docMk/>
-            <pc:sldMk cId="2230733315" sldId="260"/>
-            <ac:picMk id="11" creationId="{33DB5E8A-C8D6-4DBB-9B50-3F0982860F36}"/>
-          </ac:picMkLst>
-        </pc:picChg>
-        <pc:picChg chg="add mod">
-          <ac:chgData name="Isaac Valdez" userId="13e1ca45-44f1-4a8d-b954-611b20158646" providerId="ADAL" clId="{8F213521-C329-4D6F-8F55-1296599CF7D9}" dt="2017-09-21T13:26:07.200" v="133" actId="1076"/>
-          <ac:picMkLst>
-            <pc:docMk/>
-            <pc:sldMk cId="2230733315" sldId="260"/>
-            <ac:picMk id="13" creationId="{C0B33FE2-568A-4FB6-A1C2-11A020EC3C71}"/>
-          </ac:picMkLst>
-        </pc:picChg>
-      </pc:sldChg>
-      <pc:sldChg chg="addSp delSp modSp add">
-        <pc:chgData name="Isaac Valdez" userId="13e1ca45-44f1-4a8d-b954-611b20158646" providerId="ADAL" clId="{8F213521-C329-4D6F-8F55-1296599CF7D9}" dt="2017-09-21T13:55:23.554" v="197"/>
-        <pc:sldMkLst>
-          <pc:docMk/>
-          <pc:sldMk cId="3418709821" sldId="261"/>
-        </pc:sldMkLst>
-        <pc:spChg chg="add mod">
-          <ac:chgData name="Isaac Valdez" userId="13e1ca45-44f1-4a8d-b954-611b20158646" providerId="ADAL" clId="{8F213521-C329-4D6F-8F55-1296599CF7D9}" dt="2017-09-21T13:43:17.970" v="183" actId="1076"/>
-          <ac:spMkLst>
-            <pc:docMk/>
-            <pc:sldMk cId="3418709821" sldId="261"/>
-            <ac:spMk id="2" creationId="{5BA3CF29-DD89-4757-9DBA-1D06C8795E9D}"/>
-          </ac:spMkLst>
-        </pc:spChg>
-        <pc:spChg chg="add del">
-          <ac:chgData name="Isaac Valdez" userId="13e1ca45-44f1-4a8d-b954-611b20158646" providerId="ADAL" clId="{8F213521-C329-4D6F-8F55-1296599CF7D9}" dt="2017-09-21T13:43:19.642" v="185"/>
-          <ac:spMkLst>
-            <pc:docMk/>
-            <pc:sldMk cId="3418709821" sldId="261"/>
-            <ac:spMk id="3" creationId="{7BBD26B8-CA31-432C-8DFD-68BF8FB95C21}"/>
-          </ac:spMkLst>
-        </pc:spChg>
-        <pc:spChg chg="add del">
-          <ac:chgData name="Isaac Valdez" userId="13e1ca45-44f1-4a8d-b954-611b20158646" providerId="ADAL" clId="{8F213521-C329-4D6F-8F55-1296599CF7D9}" dt="2017-09-21T13:53:37.860" v="189"/>
-          <ac:spMkLst>
-            <pc:docMk/>
-            <pc:sldMk cId="3418709821" sldId="261"/>
-            <ac:spMk id="5" creationId="{37268DFA-33E6-434B-AF2D-466BCCD63AD2}"/>
-          </ac:spMkLst>
-        </pc:spChg>
-        <pc:spChg chg="add del">
-          <ac:chgData name="Isaac Valdez" userId="13e1ca45-44f1-4a8d-b954-611b20158646" providerId="ADAL" clId="{8F213521-C329-4D6F-8F55-1296599CF7D9}" dt="2017-09-21T13:55:22.256" v="195"/>
-          <ac:spMkLst>
-            <pc:docMk/>
-            <pc:sldMk cId="3418709821" sldId="261"/>
-            <ac:spMk id="7" creationId="{17165F56-172F-4558-AEAC-A9669084765B}"/>
-          </ac:spMkLst>
-        </pc:spChg>
-        <pc:picChg chg="add mod">
-          <ac:chgData name="Isaac Valdez" userId="13e1ca45-44f1-4a8d-b954-611b20158646" providerId="ADAL" clId="{8F213521-C329-4D6F-8F55-1296599CF7D9}" dt="2017-09-21T13:43:20.635" v="187" actId="1076"/>
-          <ac:picMkLst>
-            <pc:docMk/>
-            <pc:sldMk cId="3418709821" sldId="261"/>
-            <ac:picMk id="4" creationId="{90DE4FBB-EEF8-45CC-8161-26B51237381A}"/>
-          </ac:picMkLst>
-        </pc:picChg>
-        <pc:picChg chg="add del mod">
-          <ac:chgData name="Isaac Valdez" userId="13e1ca45-44f1-4a8d-b954-611b20158646" providerId="ADAL" clId="{8F213521-C329-4D6F-8F55-1296599CF7D9}" dt="2017-09-21T13:53:43.805" v="193"/>
-          <ac:picMkLst>
-            <pc:docMk/>
-            <pc:sldMk cId="3418709821" sldId="261"/>
-            <ac:picMk id="6" creationId="{CFAC7824-2850-4BD5-874B-7921F5593B95}"/>
-          </ac:picMkLst>
-        </pc:picChg>
-        <pc:picChg chg="add del">
-          <ac:chgData name="Isaac Valdez" userId="13e1ca45-44f1-4a8d-b954-611b20158646" providerId="ADAL" clId="{8F213521-C329-4D6F-8F55-1296599CF7D9}" dt="2017-09-21T13:55:23.554" v="197"/>
-          <ac:picMkLst>
-            <pc:docMk/>
-            <pc:sldMk cId="3418709821" sldId="261"/>
-            <ac:picMk id="8" creationId="{3AF802EB-A282-423C-B38B-29759F38523D}"/>
-          </ac:picMkLst>
-        </pc:picChg>
-      </pc:sldChg>
-    </pc:docChg>
-  </pc:docChgLst>
-</pc:chgInfo>
+<file path=ppt/revisionInfo.xml><?xml version="1.0" encoding="utf-8"?>
+<p1510:revInfo xmlns:a="http://schemas.openxmlformats.org/drawingml/2006/main" xmlns:r="http://schemas.openxmlformats.org/officeDocument/2006/relationships" xmlns:p1510="http://schemas.microsoft.com/office/powerpoint/2015/10/main"/>
 </file>
 
 <file path=ppt/slideLayouts/slideLayout1.xml><?xml version="1.0" encoding="utf-8"?>
@@ -562,7 +252,7 @@
           <a:p>
             <a:fld id="{DB8B00E8-0936-42EF-92DC-A9F9B96C46C8}" type="datetimeFigureOut">
               <a:rPr lang="en-US" smtClean="0"/>
-              <a:t>9/21/2017</a:t>
+              <a:t>11/9/2017</a:t>
             </a:fld>
             <a:endParaRPr lang="en-US"/>
           </a:p>
@@ -732,7 +422,7 @@
           <a:p>
             <a:fld id="{DB8B00E8-0936-42EF-92DC-A9F9B96C46C8}" type="datetimeFigureOut">
               <a:rPr lang="en-US" smtClean="0"/>
-              <a:t>9/21/2017</a:t>
+              <a:t>11/9/2017</a:t>
             </a:fld>
             <a:endParaRPr lang="en-US"/>
           </a:p>
@@ -912,7 +602,7 @@
           <a:p>
             <a:fld id="{DB8B00E8-0936-42EF-92DC-A9F9B96C46C8}" type="datetimeFigureOut">
               <a:rPr lang="en-US" smtClean="0"/>
-              <a:t>9/21/2017</a:t>
+              <a:t>11/9/2017</a:t>
             </a:fld>
             <a:endParaRPr lang="en-US"/>
           </a:p>
@@ -1082,7 +772,7 @@
           <a:p>
             <a:fld id="{DB8B00E8-0936-42EF-92DC-A9F9B96C46C8}" type="datetimeFigureOut">
               <a:rPr lang="en-US" smtClean="0"/>
-              <a:t>9/21/2017</a:t>
+              <a:t>11/9/2017</a:t>
             </a:fld>
             <a:endParaRPr lang="en-US"/>
           </a:p>
@@ -1326,7 +1016,7 @@
           <a:p>
             <a:fld id="{DB8B00E8-0936-42EF-92DC-A9F9B96C46C8}" type="datetimeFigureOut">
               <a:rPr lang="en-US" smtClean="0"/>
-              <a:t>9/21/2017</a:t>
+              <a:t>11/9/2017</a:t>
             </a:fld>
             <a:endParaRPr lang="en-US"/>
           </a:p>
@@ -1558,7 +1248,7 @@
           <a:p>
             <a:fld id="{DB8B00E8-0936-42EF-92DC-A9F9B96C46C8}" type="datetimeFigureOut">
               <a:rPr lang="en-US" smtClean="0"/>
-              <a:t>9/21/2017</a:t>
+              <a:t>11/9/2017</a:t>
             </a:fld>
             <a:endParaRPr lang="en-US"/>
           </a:p>
@@ -1925,7 +1615,7 @@
           <a:p>
             <a:fld id="{DB8B00E8-0936-42EF-92DC-A9F9B96C46C8}" type="datetimeFigureOut">
               <a:rPr lang="en-US" smtClean="0"/>
-              <a:t>9/21/2017</a:t>
+              <a:t>11/9/2017</a:t>
             </a:fld>
             <a:endParaRPr lang="en-US"/>
           </a:p>
@@ -2043,7 +1733,7 @@
           <a:p>
             <a:fld id="{DB8B00E8-0936-42EF-92DC-A9F9B96C46C8}" type="datetimeFigureOut">
               <a:rPr lang="en-US" smtClean="0"/>
-              <a:t>9/21/2017</a:t>
+              <a:t>11/9/2017</a:t>
             </a:fld>
             <a:endParaRPr lang="en-US"/>
           </a:p>
@@ -2138,7 +1828,7 @@
           <a:p>
             <a:fld id="{DB8B00E8-0936-42EF-92DC-A9F9B96C46C8}" type="datetimeFigureOut">
               <a:rPr lang="en-US" smtClean="0"/>
-              <a:t>9/21/2017</a:t>
+              <a:t>11/9/2017</a:t>
             </a:fld>
             <a:endParaRPr lang="en-US"/>
           </a:p>
@@ -2415,7 +2105,7 @@
           <a:p>
             <a:fld id="{DB8B00E8-0936-42EF-92DC-A9F9B96C46C8}" type="datetimeFigureOut">
               <a:rPr lang="en-US" smtClean="0"/>
-              <a:t>9/21/2017</a:t>
+              <a:t>11/9/2017</a:t>
             </a:fld>
             <a:endParaRPr lang="en-US"/>
           </a:p>
@@ -2672,7 +2362,7 @@
           <a:p>
             <a:fld id="{DB8B00E8-0936-42EF-92DC-A9F9B96C46C8}" type="datetimeFigureOut">
               <a:rPr lang="en-US" smtClean="0"/>
-              <a:t>9/21/2017</a:t>
+              <a:t>11/9/2017</a:t>
             </a:fld>
             <a:endParaRPr lang="en-US"/>
           </a:p>
@@ -2885,7 +2575,7 @@
           <a:p>
             <a:fld id="{DB8B00E8-0936-42EF-92DC-A9F9B96C46C8}" type="datetimeFigureOut">
               <a:rPr lang="en-US" smtClean="0"/>
-              <a:t>9/21/2017</a:t>
+              <a:t>11/9/2017</a:t>
             </a:fld>
             <a:endParaRPr lang="en-US"/>
           </a:p>
@@ -3523,16 +3213,14 @@
       </p:sp>
       <p:pic>
         <p:nvPicPr>
-          <p:cNvPr id="9" name="Picture 8">
+          <p:cNvPr id="4" name="Picture 3">
             <a:extLst>
               <a:ext uri="{FF2B5EF4-FFF2-40B4-BE49-F238E27FC236}">
                 <a16:creationId xmlns:a16="http://schemas.microsoft.com/office/drawing/2014/main" id="{7C61364C-5425-4773-9632-1B1B61BC2BF7}"/>
               </a:ext>
             </a:extLst>
           </p:cNvPr>
-          <p:cNvPicPr>
-            <a:picLocks noChangeAspect="1"/>
-          </p:cNvPicPr>
+          <p:cNvPicPr/>
           <p:nvPr/>
         </p:nvPicPr>
         <p:blipFill>
@@ -3543,8 +3231,8 @@
         </p:blipFill>
         <p:spPr>
           <a:xfrm>
-            <a:off x="4424129" y="2667000"/>
-            <a:ext cx="981541" cy="957155"/>
+            <a:off x="4303911" y="2667000"/>
+            <a:ext cx="212725" cy="212725"/>
           </a:xfrm>
           <a:prstGeom prst="rect">
             <a:avLst/>
@@ -4106,16 +3794,14 @@
       </mc:AlternateContent>
       <p:pic>
         <p:nvPicPr>
-          <p:cNvPr id="4" name="Picture 3">
+          <p:cNvPr id="5" name="Picture 4">
             <a:extLst>
               <a:ext uri="{FF2B5EF4-FFF2-40B4-BE49-F238E27FC236}">
                 <a16:creationId xmlns:a16="http://schemas.microsoft.com/office/drawing/2014/main" id="{E76A1A43-7E4C-42E1-96C4-99A14C417E38}"/>
               </a:ext>
             </a:extLst>
           </p:cNvPr>
-          <p:cNvPicPr>
-            <a:picLocks noChangeAspect="1"/>
-          </p:cNvPicPr>
+          <p:cNvPicPr/>
           <p:nvPr/>
         </p:nvPicPr>
         <p:blipFill>
@@ -4126,8 +3812,8 @@
         </p:blipFill>
         <p:spPr>
           <a:xfrm>
-            <a:off x="5367098" y="2164328"/>
-            <a:ext cx="3535986" cy="3529890"/>
+            <a:off x="6009525" y="3827433"/>
+            <a:ext cx="200660" cy="200660"/>
           </a:xfrm>
           <a:prstGeom prst="rect">
             <a:avLst/>
@@ -4422,10 +4108,10 @@
       </p:sp>
       <p:pic>
         <p:nvPicPr>
-          <p:cNvPr id="13" name="Picture 12">
+          <p:cNvPr id="8" name="Picture 7">
             <a:extLst>
               <a:ext uri="{FF2B5EF4-FFF2-40B4-BE49-F238E27FC236}">
-                <a16:creationId xmlns:a16="http://schemas.microsoft.com/office/drawing/2014/main" id="{0BE16900-9C11-4837-9F5A-8A04029A0207}"/>
+                <a16:creationId xmlns:a16="http://schemas.microsoft.com/office/drawing/2014/main" id="{68B08C94-07FF-4FF4-89D3-A5B2B990EBAC}"/>
               </a:ext>
             </a:extLst>
           </p:cNvPr>
@@ -4442,8 +4128,8 @@
         </p:blipFill>
         <p:spPr>
           <a:xfrm>
-            <a:off x="5367660" y="2687656"/>
-            <a:ext cx="3340898" cy="2895851"/>
+            <a:off x="6469900" y="3539838"/>
+            <a:ext cx="200660" cy="173930"/>
           </a:xfrm>
           <a:prstGeom prst="rect">
             <a:avLst/>
@@ -4756,16 +4442,14 @@
       </p:sp>
       <p:pic>
         <p:nvPicPr>
-          <p:cNvPr id="13" name="Picture 12">
+          <p:cNvPr id="5" name="Picture 4">
             <a:extLst>
               <a:ext uri="{FF2B5EF4-FFF2-40B4-BE49-F238E27FC236}">
-                <a16:creationId xmlns:a16="http://schemas.microsoft.com/office/drawing/2014/main" id="{C0B33FE2-568A-4FB6-A1C2-11A020EC3C71}"/>
+                <a16:creationId xmlns:a16="http://schemas.microsoft.com/office/drawing/2014/main" id="{65422750-3155-4E11-9F42-9450A04FD397}"/>
               </a:ext>
             </a:extLst>
           </p:cNvPr>
-          <p:cNvPicPr>
-            <a:picLocks noChangeAspect="1"/>
-          </p:cNvPicPr>
+          <p:cNvPicPr/>
           <p:nvPr/>
         </p:nvPicPr>
         <p:blipFill>
@@ -4776,8 +4460,8 @@
         </p:blipFill>
         <p:spPr>
           <a:xfrm>
-            <a:off x="5938411" y="2244226"/>
-            <a:ext cx="2499577" cy="2725148"/>
+            <a:off x="6334760" y="3684270"/>
+            <a:ext cx="182880" cy="200660"/>
           </a:xfrm>
           <a:prstGeom prst="rect">
             <a:avLst/>
@@ -4814,8 +4498,8 @@
           <a:chExt cx="0" cy="0"/>
         </a:xfrm>
       </p:grpSpPr>
-      <mc:AlternateContent xmlns:mc="http://schemas.openxmlformats.org/markup-compatibility/2006">
-        <mc:Choice xmlns:a14="http://schemas.microsoft.com/office/drawing/2010/main" Requires="a14">
+      <mc:AlternateContent xmlns:mc="http://schemas.openxmlformats.org/markup-compatibility/2006" xmlns:a14="http://schemas.microsoft.com/office/drawing/2010/main">
+        <mc:Choice Requires="a14">
           <p:sp>
             <p:nvSpPr>
               <p:cNvPr id="2" name="Isosceles Triangle 1">
@@ -4881,7 +4565,7 @@
             </p:txBody>
           </p:sp>
         </mc:Choice>
-        <mc:Fallback>
+        <mc:Fallback xmlns="">
           <p:sp>
             <p:nvSpPr>
               <p:cNvPr id="2" name="Isosceles Triangle 1">
@@ -4931,10 +4615,10 @@
       </mc:AlternateContent>
       <p:pic>
         <p:nvPicPr>
-          <p:cNvPr id="4" name="Picture 3">
+          <p:cNvPr id="5" name="Picture 4">
             <a:extLst>
               <a:ext uri="{FF2B5EF4-FFF2-40B4-BE49-F238E27FC236}">
-                <a16:creationId xmlns:a16="http://schemas.microsoft.com/office/drawing/2014/main" id="{90DE4FBB-EEF8-45CC-8161-26B51237381A}"/>
+                <a16:creationId xmlns:a16="http://schemas.microsoft.com/office/drawing/2014/main" id="{ADFFC97B-E475-4E57-93C4-0AB623CFF11A}"/>
               </a:ext>
             </a:extLst>
           </p:cNvPr>
@@ -4951,8 +4635,8 @@
         </p:blipFill>
         <p:spPr>
           <a:xfrm>
-            <a:off x="4125820" y="2305678"/>
-            <a:ext cx="3584759" cy="3084843"/>
+            <a:off x="6009526" y="3827433"/>
+            <a:ext cx="233178" cy="200660"/>
           </a:xfrm>
           <a:prstGeom prst="rect">
             <a:avLst/>

</xml_diff>